<commit_message>
Fixes and TODOs for intro to spreadsheets slides
</commit_message>
<xml_diff>
--- a/Courses/Computer-Modeling-and-IT/Computer-Modeling-and-IT-5-Class/28-Introduction-to-Spreadsheets/28-Introduction-To-Spreadsheets.pptx
+++ b/Courses/Computer-Modeling-and-IT/Computer-Modeling-and-IT-5-Class/28-Introduction-to-Spreadsheets/28-Introduction-To-Spreadsheets.pptx
@@ -295,7 +295,7 @@
           <a:p>
             <a:fld id="{4E087215-0C8F-4762-A664-737A353EC9A4}" type="datetimeFigureOut">
               <a:rPr lang="bg-BG" smtClean="0"/>
-              <a:t>11.10.2023 г.</a:t>
+              <a:t>16.10.23 г.</a:t>
             </a:fld>
             <a:endParaRPr lang="bg-BG"/>
           </a:p>
@@ -491,7 +491,7 @@
           <a:p>
             <a:fld id="{72D84649-876A-46C9-8472-14CB09C070D8}" type="datetimeFigureOut">
               <a:rPr lang="en-US" smtClean="0"/>
-              <a:t>10/11/2023</a:t>
+              <a:t>10/16/23</a:t>
             </a:fld>
             <a:endParaRPr lang="en-US"/>
           </a:p>
@@ -6849,7 +6849,7 @@
           <a:p>
             <a:r>
               <a:rPr lang="bg-BG" dirty="0"/>
-              <a:t>Софтуерни и хардуерни науки</a:t>
+              <a:t>5 клас</a:t>
             </a:r>
           </a:p>
         </p:txBody>
@@ -6884,19 +6884,7 @@
           <a:p>
             <a:r>
               <a:rPr lang="bg-BG" dirty="0"/>
-              <a:t>Курс </a:t>
-            </a:r>
-            <a:r>
-              <a:rPr lang="bg-BG" dirty="0" smtClean="0"/>
-              <a:t>"</a:t>
-            </a:r>
-            <a:r>
-              <a:rPr lang="bg-BG" dirty="0"/>
-              <a:t>Въведение в електронните таблици</a:t>
-            </a:r>
-            <a:r>
-              <a:rPr lang="bg-BG" dirty="0" smtClean="0"/>
-              <a:t>"</a:t>
+              <a:t>Компютърно моделиране и ИТ</a:t>
             </a:r>
             <a:endParaRPr lang="en-US" dirty="0"/>
           </a:p>
@@ -6994,26 +6982,23 @@
         <p:spPr>
           <a:xfrm>
             <a:off x="554746" y="1402942"/>
-            <a:ext cx="11083636" cy="1306057"/>
+            <a:ext cx="11083636" cy="825597"/>
           </a:xfrm>
         </p:spPr>
         <p:txBody>
           <a:bodyPr>
-            <a:normAutofit lnSpcReduction="10000"/>
+            <a:normAutofit/>
           </a:bodyPr>
           <a:lstStyle/>
           <a:p>
             <a:r>
               <a:rPr lang="bg-BG" dirty="0"/>
-              <a:t>Работна група "Образование по програмиране и ИТ"</a:t>
-            </a:r>
-          </a:p>
-          <a:p>
-            <a:r>
-              <a:rPr lang="bg-BG" dirty="0"/>
-              <a:t>Свободно учебно съдържание за учители</a:t>
-            </a:r>
-            <a:endParaRPr lang="en-US" dirty="0"/>
+              <a:t>Същност и елементи. </a:t>
+            </a:r>
+            <a:r>
+              <a:rPr lang="en-US" dirty="0"/>
+              <a:t>MS Excel</a:t>
+            </a:r>
           </a:p>
         </p:txBody>
       </p:sp>
@@ -7044,8 +7029,8 @@
           <a:lstStyle/>
           <a:p>
             <a:r>
-              <a:rPr lang="bg-BG"/>
-              <a:t>Свободни учебни ресурси</a:t>
+              <a:rPr lang="bg-BG" dirty="0"/>
+              <a:t>Въведение в електронните таблици</a:t>
             </a:r>
             <a:endParaRPr lang="en-US" dirty="0"/>
           </a:p>
@@ -7081,6 +7066,68 @@
           </a:prstGeom>
         </p:spPr>
       </p:pic>
+      <p:sp>
+        <p:nvSpPr>
+          <p:cNvPr id="5" name="TextBox 4">
+            <a:extLst>
+              <a:ext uri="{FF2B5EF4-FFF2-40B4-BE49-F238E27FC236}">
+                <a16:creationId xmlns:a16="http://schemas.microsoft.com/office/drawing/2014/main" id="{4C757B7E-FFFE-6DF8-FB82-02BAF8F7B32E}"/>
+              </a:ext>
+            </a:extLst>
+          </p:cNvPr>
+          <p:cNvSpPr txBox="1"/>
+          <p:nvPr/>
+        </p:nvSpPr>
+        <p:spPr>
+          <a:xfrm>
+            <a:off x="5801878" y="2484000"/>
+            <a:ext cx="4940099" cy="861362"/>
+          </a:xfrm>
+          <a:prstGeom prst="rect">
+            <a:avLst/>
+          </a:prstGeom>
+          <a:ln/>
+        </p:spPr>
+        <p:style>
+          <a:lnRef idx="2">
+            <a:schemeClr val="accent2"/>
+          </a:lnRef>
+          <a:fillRef idx="1">
+            <a:schemeClr val="lt1"/>
+          </a:fillRef>
+          <a:effectRef idx="0">
+            <a:schemeClr val="accent2"/>
+          </a:effectRef>
+          <a:fontRef idx="minor">
+            <a:schemeClr val="dk1"/>
+          </a:fontRef>
+        </p:style>
+        <p:txBody>
+          <a:bodyPr vert="horz" wrap="none" lIns="144000" tIns="108000" rIns="144000" bIns="108000" rtlCol="0">
+            <a:spAutoFit/>
+          </a:bodyPr>
+          <a:lstStyle/>
+          <a:p>
+            <a:pPr algn="l" eaLnBrk="0" hangingPunct="0">
+              <a:lnSpc>
+                <a:spcPct val="110000"/>
+              </a:lnSpc>
+              <a:buClr>
+                <a:schemeClr val="accent5">
+                  <a:lumMod val="40000"/>
+                  <a:lumOff val="60000"/>
+                </a:schemeClr>
+              </a:buClr>
+              <a:buSzPct val="70000"/>
+            </a:pPr>
+            <a:r>
+              <a:rPr lang="en-US" sz="4000" b="1" dirty="0"/>
+              <a:t>TODO: change picture</a:t>
+            </a:r>
+            <a:endParaRPr lang="bg-BG" sz="4000" b="1" dirty="0"/>
+          </a:p>
+        </p:txBody>
+      </p:sp>
     </p:spTree>
     <p:extLst>
       <p:ext uri="{BB962C8B-B14F-4D97-AF65-F5344CB8AC3E}">
@@ -7099,13 +7146,6 @@
       <p:transition spd="slow" advClick="0" advTm="5000"/>
     </mc:Fallback>
   </mc:AlternateContent>
-  <p:timing>
-    <p:tnLst>
-      <p:par>
-        <p:cTn id="1" dur="indefinite" restart="never" nodeType="tmRoot"/>
-      </p:par>
-    </p:tnLst>
-  </p:timing>
 </p:sld>
 </file>
 
@@ -7142,14 +7182,13 @@
           <a:lstStyle/>
           <a:p>
             <a:r>
-              <a:rPr lang="bg-BG" dirty="0" smtClean="0"/>
+              <a:rPr lang="bg-BG" dirty="0"/>
               <a:t>Създаване на ел. таблица в </a:t>
             </a:r>
             <a:r>
-              <a:rPr lang="en-US" dirty="0" smtClean="0"/>
+              <a:rPr lang="en-US" dirty="0"/>
               <a:t>Excel</a:t>
             </a:r>
-            <a:endParaRPr lang="en-US" dirty="0"/>
           </a:p>
         </p:txBody>
       </p:sp>
@@ -7242,7 +7281,7 @@
           <a:p>
             <a:pPr algn="ctr"/>
             <a:r>
-              <a:rPr lang="bg-BG" sz="2800" b="1" dirty="0" smtClean="0">
+              <a:rPr lang="bg-BG" sz="2800" b="1" dirty="0">
                 <a:solidFill>
                   <a:srgbClr val="FFFFFF"/>
                 </a:solidFill>
@@ -7257,7 +7296,7 @@
               <a:t>За да създадем нова празна ел. таблица, избираме </a:t>
             </a:r>
             <a:r>
-              <a:rPr lang="en-US" sz="2800" b="1" dirty="0" smtClean="0">
+              <a:rPr lang="en-US" sz="2800" b="1" dirty="0">
                 <a:solidFill>
                   <a:schemeClr val="bg1">
                     <a:lumMod val="60000"/>
@@ -7274,21 +7313,6 @@
               </a:rPr>
               <a:t>Blank workbook</a:t>
             </a:r>
-            <a:endParaRPr lang="en-US" sz="2800" b="1" dirty="0">
-              <a:solidFill>
-                <a:schemeClr val="bg1">
-                  <a:lumMod val="60000"/>
-                  <a:lumOff val="40000"/>
-                </a:schemeClr>
-              </a:solidFill>
-              <a:effectLst>
-                <a:outerShdw blurRad="38100" dist="38100" dir="2700000" algn="tl">
-                  <a:srgbClr val="000000">
-                    <a:alpha val="43137"/>
-                  </a:srgbClr>
-                </a:outerShdw>
-              </a:effectLst>
-            </a:endParaRPr>
           </a:p>
         </p:txBody>
       </p:sp>
@@ -7310,13 +7334,6 @@
       <p:transition spd="slow" advClick="0" advTm="5000"/>
     </mc:Fallback>
   </mc:AlternateContent>
-  <p:timing>
-    <p:tnLst>
-      <p:par>
-        <p:cTn id="1" dur="indefinite" restart="never" nodeType="tmRoot"/>
-      </p:par>
-    </p:tnLst>
-  </p:timing>
 </p:sld>
 </file>
 
@@ -7377,14 +7394,13 @@
           <a:lstStyle/>
           <a:p>
             <a:r>
-              <a:rPr lang="bg-BG" dirty="0" smtClean="0"/>
+              <a:rPr lang="bg-BG" dirty="0"/>
               <a:t>Елементи в </a:t>
             </a:r>
             <a:r>
-              <a:rPr lang="en-US" dirty="0" smtClean="0"/>
+              <a:rPr lang="en-US" dirty="0"/>
               <a:t>Excel</a:t>
             </a:r>
-            <a:endParaRPr lang="en-US" dirty="0"/>
           </a:p>
         </p:txBody>
       </p:sp>
@@ -7477,7 +7493,7 @@
           <a:p>
             <a:pPr algn="ctr"/>
             <a:r>
-              <a:rPr lang="bg-BG" sz="2800" b="1" dirty="0" smtClean="0">
+              <a:rPr lang="bg-BG" sz="2800" b="1" dirty="0">
                 <a:solidFill>
                   <a:srgbClr val="FFFFFF"/>
                 </a:solidFill>
@@ -7633,7 +7649,7 @@
           <a:p>
             <a:pPr algn="ctr"/>
             <a:r>
-              <a:rPr lang="bg-BG" sz="2800" b="1" dirty="0" smtClean="0">
+              <a:rPr lang="bg-BG" sz="2800" b="1" dirty="0">
                 <a:solidFill>
                   <a:srgbClr val="FFFFFF"/>
                 </a:solidFill>
@@ -7789,7 +7805,7 @@
           <a:p>
             <a:pPr algn="ctr"/>
             <a:r>
-              <a:rPr lang="bg-BG" sz="2800" b="1" smtClean="0">
+              <a:rPr lang="bg-BG" sz="2800" b="1">
                 <a:solidFill>
                   <a:srgbClr val="FFFFFF"/>
                 </a:solidFill>
@@ -7878,7 +7894,7 @@
           <a:p>
             <a:pPr algn="ctr"/>
             <a:r>
-              <a:rPr lang="bg-BG" sz="2800" b="1" dirty="0" smtClean="0">
+              <a:rPr lang="bg-BG" sz="2800" b="1" dirty="0">
                 <a:solidFill>
                   <a:srgbClr val="FFFFFF"/>
                 </a:solidFill>
@@ -7967,7 +7983,7 @@
           <a:p>
             <a:pPr algn="ctr"/>
             <a:r>
-              <a:rPr lang="bg-BG" sz="2800" b="1" dirty="0" smtClean="0">
+              <a:rPr lang="bg-BG" sz="2800" b="1" dirty="0">
                 <a:solidFill>
                   <a:srgbClr val="FFFFFF"/>
                 </a:solidFill>
@@ -8056,7 +8072,7 @@
           <a:p>
             <a:pPr algn="ctr"/>
             <a:r>
-              <a:rPr lang="bg-BG" sz="2800" b="1" dirty="0" smtClean="0">
+              <a:rPr lang="bg-BG" sz="2800" b="1" dirty="0">
                 <a:solidFill>
                   <a:srgbClr val="FFFFFF"/>
                 </a:solidFill>
@@ -8789,14 +8805,13 @@
           <a:lstStyle/>
           <a:p>
             <a:r>
-              <a:rPr lang="bg-BG" dirty="0" smtClean="0"/>
+              <a:rPr lang="bg-BG" dirty="0"/>
               <a:t>Запазване на документ в </a:t>
             </a:r>
             <a:r>
-              <a:rPr lang="en-US" dirty="0" smtClean="0"/>
+              <a:rPr lang="en-US" dirty="0"/>
               <a:t>Excel</a:t>
             </a:r>
-            <a:endParaRPr lang="en-US" dirty="0"/>
           </a:p>
         </p:txBody>
       </p:sp>
@@ -8889,7 +8904,7 @@
           <a:p>
             <a:pPr algn="ctr"/>
             <a:r>
-              <a:rPr lang="bg-BG" sz="2800" b="1" dirty="0" smtClean="0">
+              <a:rPr lang="bg-BG" sz="2800" b="1" dirty="0">
                 <a:solidFill>
                   <a:srgbClr val="FFFFFF"/>
                 </a:solidFill>
@@ -8904,7 +8919,7 @@
               <a:t>Както и при </a:t>
             </a:r>
             <a:r>
-              <a:rPr lang="en-US" sz="2800" b="1" dirty="0" smtClean="0">
+              <a:rPr lang="en-US" sz="2800" b="1" dirty="0">
                 <a:solidFill>
                   <a:srgbClr val="FFFFFF"/>
                 </a:solidFill>
@@ -8919,7 +8934,7 @@
               <a:t>MS Word</a:t>
             </a:r>
             <a:r>
-              <a:rPr lang="bg-BG" sz="2800" b="1" dirty="0" smtClean="0">
+              <a:rPr lang="bg-BG" sz="2800" b="1" dirty="0">
                 <a:solidFill>
                   <a:srgbClr val="FFFFFF"/>
                 </a:solidFill>
@@ -8934,7 +8949,7 @@
               <a:t>, отваряме менюто </a:t>
             </a:r>
             <a:r>
-              <a:rPr lang="en-US" sz="2800" b="1" dirty="0" smtClean="0">
+              <a:rPr lang="en-US" sz="2800" b="1" dirty="0">
                 <a:solidFill>
                   <a:schemeClr val="bg1">
                     <a:lumMod val="60000"/>
@@ -8952,7 +8967,7 @@
               <a:t>File</a:t>
             </a:r>
             <a:r>
-              <a:rPr lang="en-US" sz="2800" b="1" dirty="0" smtClean="0">
+              <a:rPr lang="en-US" sz="2800" b="1" dirty="0">
                 <a:solidFill>
                   <a:srgbClr val="FFFFFF"/>
                 </a:solidFill>
@@ -8967,7 +8982,7 @@
               <a:t> </a:t>
             </a:r>
             <a:r>
-              <a:rPr lang="bg-BG" sz="2800" b="1" dirty="0" smtClean="0">
+              <a:rPr lang="bg-BG" sz="2800" b="1" dirty="0">
                 <a:solidFill>
                   <a:srgbClr val="FFFFFF"/>
                 </a:solidFill>
@@ -9223,13 +9238,6 @@
       <p:transition spd="slow" advClick="0" advTm="5000"/>
     </mc:Fallback>
   </mc:AlternateContent>
-  <p:timing>
-    <p:tnLst>
-      <p:par>
-        <p:cTn id="1" dur="indefinite" restart="never" nodeType="tmRoot"/>
-      </p:par>
-    </p:tnLst>
-  </p:timing>
 </p:sld>
 </file>
 
@@ -9292,7 +9300,7 @@
           <a:lstStyle/>
           <a:p>
             <a:r>
-              <a:rPr lang="bg-BG" sz="3400" dirty="0" smtClean="0"/>
+              <a:rPr lang="bg-BG" sz="3400" dirty="0"/>
               <a:t>Маркиране на клетки</a:t>
             </a:r>
             <a:endParaRPr lang="en-US" sz="3400" dirty="0"/>
@@ -9308,7 +9316,7 @@
           <p:nvPr>
             <p:extLst>
               <p:ext uri="{D42A27DB-BD31-4B8C-83A1-F6EECF244321}">
-                <p14:modId xmlns:p14="http://schemas.microsoft.com/office/powerpoint/2010/main" val="2473317649"/>
+                <p14:modId xmlns:p14="http://schemas.microsoft.com/office/powerpoint/2010/main" val="57055384"/>
               </p:ext>
             </p:extLst>
           </p:nvPr>
@@ -9347,7 +9355,7 @@
                     <a:p>
                       <a:pPr algn="ctr"/>
                       <a:r>
-                        <a:rPr lang="bg-BG" dirty="0" smtClean="0">
+                        <a:rPr lang="bg-BG" dirty="0">
                           <a:solidFill>
                             <a:schemeClr val="bg2"/>
                           </a:solidFill>
@@ -9355,7 +9363,7 @@
                         <a:t>Методи за маркиране в</a:t>
                       </a:r>
                       <a:r>
-                        <a:rPr lang="bg-BG" baseline="0" dirty="0" smtClean="0">
+                        <a:rPr lang="bg-BG" baseline="0" dirty="0">
                           <a:solidFill>
                             <a:schemeClr val="bg2"/>
                           </a:solidFill>
@@ -9363,7 +9371,7 @@
                         <a:t> </a:t>
                       </a:r>
                       <a:r>
-                        <a:rPr lang="en-US" baseline="0" dirty="0" smtClean="0">
+                        <a:rPr lang="en-US" baseline="0" dirty="0">
                           <a:solidFill>
                             <a:schemeClr val="bg2"/>
                           </a:solidFill>
@@ -9484,15 +9492,15 @@
                     <a:lstStyle/>
                     <a:p>
                       <a:r>
-                        <a:rPr lang="bg-BG" dirty="0" smtClean="0"/>
+                        <a:rPr lang="bg-BG" dirty="0"/>
                         <a:t>Една</a:t>
                       </a:r>
                       <a:r>
-                        <a:rPr lang="bg-BG" baseline="0" dirty="0" smtClean="0"/>
+                        <a:rPr lang="bg-BG" baseline="0" dirty="0"/>
                         <a:t> клетк</a:t>
                       </a:r>
                       <a:r>
-                        <a:rPr lang="en-US" baseline="0" dirty="0" smtClean="0"/>
+                        <a:rPr lang="en-US" baseline="0" dirty="0"/>
                         <a:t>a</a:t>
                       </a:r>
                       <a:endParaRPr lang="en-US" dirty="0"/>
@@ -9543,11 +9551,11 @@
                     <a:lstStyle/>
                     <a:p>
                       <a:r>
-                        <a:rPr lang="bg-BG" dirty="0" smtClean="0"/>
+                        <a:rPr lang="bg-BG" dirty="0"/>
                         <a:t>Щраквате</a:t>
                       </a:r>
                       <a:r>
-                        <a:rPr lang="bg-BG" baseline="0" dirty="0" smtClean="0"/>
+                        <a:rPr lang="bg-BG" baseline="0" dirty="0"/>
                         <a:t> върху нея</a:t>
                       </a:r>
                       <a:endParaRPr lang="en-US" dirty="0"/>
@@ -9622,10 +9630,10 @@
                         <a:defRPr/>
                       </a:pPr>
                       <a:r>
-                        <a:rPr lang="bg-BG" baseline="0" dirty="0" smtClean="0"/>
+                        <a:rPr lang="bg-BG" baseline="0" dirty="0"/>
                         <a:t>Област от клетки</a:t>
                       </a:r>
-                      <a:endParaRPr lang="en-US" dirty="0" smtClean="0"/>
+                      <a:endParaRPr lang="en-US" dirty="0"/>
                     </a:p>
                   </a:txBody>
                   <a:tcPr marT="91440" marB="91440" anchor="ctr">
@@ -9673,17 +9681,17 @@
                     <a:lstStyle/>
                     <a:p>
                       <a:r>
-                        <a:rPr lang="bg-BG" dirty="0" smtClean="0"/>
+                        <a:rPr lang="bg-BG" dirty="0"/>
                         <a:t>Щраквате</a:t>
                       </a:r>
                       <a:r>
-                        <a:rPr lang="bg-BG" baseline="0" dirty="0" smtClean="0"/>
+                        <a:rPr lang="bg-BG" baseline="0" dirty="0"/>
                         <a:t> с левия бутон на мишката върху началната </a:t>
                       </a:r>
                     </a:p>
                     <a:p>
                       <a:r>
-                        <a:rPr lang="bg-BG" baseline="0" dirty="0" smtClean="0"/>
+                        <a:rPr lang="bg-BG" baseline="0" dirty="0"/>
                         <a:t>клетка и влачите до края на желаната област</a:t>
                       </a:r>
                       <a:endParaRPr lang="en-US" dirty="0"/>
@@ -9741,11 +9749,11 @@
                     <a:lstStyle/>
                     <a:p>
                       <a:r>
-                        <a:rPr lang="bg-BG" dirty="0" smtClean="0"/>
+                        <a:rPr lang="bg-BG" dirty="0"/>
                         <a:t>Несъседни</a:t>
                       </a:r>
                       <a:r>
-                        <a:rPr lang="bg-BG" baseline="0" dirty="0" smtClean="0"/>
+                        <a:rPr lang="bg-BG" baseline="0" dirty="0"/>
                         <a:t> клетки</a:t>
                       </a:r>
                       <a:endParaRPr lang="en-US" dirty="0"/>
@@ -9796,25 +9804,25 @@
                     <a:lstStyle/>
                     <a:p>
                       <a:r>
-                        <a:rPr lang="bg-BG" dirty="0" smtClean="0"/>
+                        <a:rPr lang="bg-BG" dirty="0"/>
                         <a:t>Маркирате</a:t>
                       </a:r>
                       <a:r>
-                        <a:rPr lang="bg-BG" baseline="0" dirty="0" smtClean="0"/>
-                        <a:t> една по една вскяка клетка, държейки </a:t>
+                        <a:rPr lang="bg-BG" baseline="0" dirty="0"/>
+                        <a:t> една по една всяка клетка, държейки </a:t>
                       </a:r>
                     </a:p>
                     <a:p>
                       <a:r>
-                        <a:rPr lang="bg-BG" baseline="0" dirty="0" smtClean="0"/>
+                        <a:rPr lang="bg-BG" baseline="0" dirty="0"/>
                         <a:t>клавиша </a:t>
                       </a:r>
                       <a:r>
-                        <a:rPr lang="en-US" baseline="0" dirty="0" smtClean="0"/>
+                        <a:rPr lang="en-US" baseline="0" dirty="0"/>
                         <a:t>[</a:t>
                       </a:r>
                       <a:r>
-                        <a:rPr lang="en-US" b="1" baseline="0" dirty="0" smtClean="0">
+                        <a:rPr lang="en-US" b="1" baseline="0" dirty="0">
                           <a:solidFill>
                             <a:schemeClr val="bg1"/>
                           </a:solidFill>
@@ -9822,11 +9830,11 @@
                         <a:t>Ctrl</a:t>
                       </a:r>
                       <a:r>
-                        <a:rPr lang="en-US" baseline="0" dirty="0" smtClean="0"/>
+                        <a:rPr lang="en-US" baseline="0" dirty="0"/>
                         <a:t>] </a:t>
                       </a:r>
                       <a:r>
-                        <a:rPr lang="bg-BG" baseline="0" dirty="0" smtClean="0"/>
+                        <a:rPr lang="bg-BG" baseline="0" dirty="0"/>
                         <a:t>натиснат</a:t>
                       </a:r>
                       <a:endParaRPr lang="en-US" dirty="0"/>
@@ -9884,11 +9892,11 @@
                     <a:lstStyle/>
                     <a:p>
                       <a:r>
-                        <a:rPr lang="bg-BG" dirty="0" smtClean="0"/>
+                        <a:rPr lang="bg-BG" dirty="0"/>
                         <a:t>Ред</a:t>
                       </a:r>
                       <a:r>
-                        <a:rPr lang="bg-BG" baseline="0" dirty="0" smtClean="0"/>
+                        <a:rPr lang="bg-BG" baseline="0" dirty="0"/>
                         <a:t> или колона</a:t>
                       </a:r>
                       <a:endParaRPr lang="en-US" dirty="0"/>
@@ -9939,17 +9947,17 @@
                     <a:lstStyle/>
                     <a:p>
                       <a:r>
-                        <a:rPr lang="bg-BG" dirty="0" smtClean="0"/>
+                        <a:rPr lang="bg-BG" dirty="0"/>
                         <a:t>Щраквате</a:t>
                       </a:r>
                       <a:r>
-                        <a:rPr lang="bg-BG" baseline="0" dirty="0" smtClean="0"/>
+                        <a:rPr lang="bg-BG" baseline="0" dirty="0"/>
                         <a:t> с мишката на селектора пред реда или</a:t>
                       </a:r>
                     </a:p>
                     <a:p>
                       <a:r>
-                        <a:rPr lang="bg-BG" baseline="0" dirty="0" smtClean="0"/>
+                        <a:rPr lang="bg-BG" baseline="0" dirty="0"/>
                         <a:t>колоната</a:t>
                       </a:r>
                       <a:endParaRPr lang="en-US" dirty="0"/>
@@ -10022,13 +10030,6 @@
       <p:transition spd="slow" advClick="0" advTm="5000"/>
     </mc:Fallback>
   </mc:AlternateContent>
-  <p:timing>
-    <p:tnLst>
-      <p:par>
-        <p:cTn id="1" dur="indefinite" restart="never" nodeType="tmRoot"/>
-      </p:par>
-    </p:tnLst>
-  </p:timing>
 </p:sld>
 </file>
 
@@ -10065,11 +10066,11 @@
           <a:lstStyle/>
           <a:p>
             <a:r>
-              <a:rPr lang="bg-BG" b="1" dirty="0" smtClean="0"/>
+              <a:rPr lang="bg-BG" b="1" dirty="0"/>
               <a:t>Въвеждането на данни </a:t>
             </a:r>
             <a:r>
-              <a:rPr lang="bg-BG" dirty="0" smtClean="0"/>
+              <a:rPr lang="bg-BG" dirty="0"/>
               <a:t>в ел. таблица се извършва в следната последователност:</a:t>
             </a:r>
           </a:p>
@@ -10082,15 +10083,15 @@
               <a:buAutoNum type="arabicPeriod"/>
             </a:pPr>
             <a:r>
-              <a:rPr lang="bg-BG" dirty="0" smtClean="0"/>
+              <a:rPr lang="bg-BG" dirty="0"/>
               <a:t>͏</a:t>
             </a:r>
             <a:r>
-              <a:rPr lang="bg-BG" b="1" dirty="0" smtClean="0"/>
+              <a:rPr lang="bg-BG" b="1" dirty="0"/>
               <a:t>Маркирате клетката</a:t>
             </a:r>
             <a:r>
-              <a:rPr lang="bg-BG" dirty="0" smtClean="0"/>
+              <a:rPr lang="bg-BG" dirty="0"/>
               <a:t>, в която искате да въвеждате данните</a:t>
             </a:r>
           </a:p>
@@ -10103,11 +10104,11 @@
               <a:buAutoNum type="arabicPeriod"/>
             </a:pPr>
             <a:r>
-              <a:rPr lang="bg-BG" dirty="0" smtClean="0"/>
+              <a:rPr lang="bg-BG" dirty="0"/>
               <a:t>͏</a:t>
             </a:r>
             <a:r>
-              <a:rPr lang="bg-BG" b="1" dirty="0" smtClean="0"/>
+              <a:rPr lang="bg-BG" b="1" dirty="0"/>
               <a:t>Въвеждате данните</a:t>
             </a:r>
           </a:p>
@@ -10120,23 +10121,23 @@
               <a:buAutoNum type="arabicPeriod"/>
             </a:pPr>
             <a:r>
-              <a:rPr lang="bg-BG" dirty="0" smtClean="0"/>
+              <a:rPr lang="bg-BG" dirty="0"/>
               <a:t>͏</a:t>
             </a:r>
             <a:r>
-              <a:rPr lang="bg-BG" b="1" dirty="0" smtClean="0"/>
+              <a:rPr lang="bg-BG" b="1" dirty="0"/>
               <a:t>Потвърждавате</a:t>
             </a:r>
             <a:r>
-              <a:rPr lang="bg-BG" dirty="0" smtClean="0"/>
+              <a:rPr lang="bg-BG" dirty="0"/>
               <a:t> чрез клавиша </a:t>
             </a:r>
             <a:r>
-              <a:rPr lang="en-US" dirty="0" smtClean="0"/>
+              <a:rPr lang="en-US" dirty="0"/>
               <a:t>[</a:t>
             </a:r>
             <a:r>
-              <a:rPr lang="en-US" b="1" dirty="0" smtClean="0">
+              <a:rPr lang="en-US" b="1" dirty="0">
                 <a:solidFill>
                   <a:schemeClr val="bg1"/>
                 </a:solidFill>
@@ -10144,10 +10145,9 @@
               <a:t>Enter</a:t>
             </a:r>
             <a:r>
-              <a:rPr lang="en-US" dirty="0" smtClean="0"/>
+              <a:rPr lang="en-US" dirty="0"/>
               <a:t>]</a:t>
             </a:r>
-            <a:endParaRPr lang="en-US" dirty="0"/>
           </a:p>
         </p:txBody>
       </p:sp>
@@ -10167,7 +10167,7 @@
           <a:lstStyle/>
           <a:p>
             <a:r>
-              <a:rPr lang="bg-BG" dirty="0" smtClean="0"/>
+              <a:rPr lang="bg-BG" dirty="0"/>
               <a:t>Въвеждане на данни</a:t>
             </a:r>
             <a:endParaRPr lang="en-US" dirty="0"/>
@@ -10228,7 +10228,7 @@
                                         <p:tgtEl>
                                           <p:spTgt spid="5">
                                             <p:txEl>
-                                              <p:pRg st="2" end="2"/>
+                                              <p:pRg st="1" end="1"/>
                                             </p:txEl>
                                           </p:spTgt>
                                         </p:tgtEl>
@@ -10270,6 +10270,55 @@
                                     <p:set>
                                       <p:cBhvr>
                                         <p:cTn id="10" dur="1" fill="hold">
+                                          <p:stCondLst>
+                                            <p:cond delay="0"/>
+                                          </p:stCondLst>
+                                        </p:cTn>
+                                        <p:tgtEl>
+                                          <p:spTgt spid="5">
+                                            <p:txEl>
+                                              <p:pRg st="2" end="2"/>
+                                            </p:txEl>
+                                          </p:spTgt>
+                                        </p:tgtEl>
+                                        <p:attrNameLst>
+                                          <p:attrName>style.visibility</p:attrName>
+                                        </p:attrNameLst>
+                                      </p:cBhvr>
+                                      <p:to>
+                                        <p:strVal val="visible"/>
+                                      </p:to>
+                                    </p:set>
+                                  </p:childTnLst>
+                                </p:cTn>
+                              </p:par>
+                            </p:childTnLst>
+                          </p:cTn>
+                        </p:par>
+                      </p:childTnLst>
+                    </p:cTn>
+                  </p:par>
+                  <p:par>
+                    <p:cTn id="11" fill="hold">
+                      <p:stCondLst>
+                        <p:cond delay="indefinite"/>
+                      </p:stCondLst>
+                      <p:childTnLst>
+                        <p:par>
+                          <p:cTn id="12" fill="hold">
+                            <p:stCondLst>
+                              <p:cond delay="0"/>
+                            </p:stCondLst>
+                            <p:childTnLst>
+                              <p:par>
+                                <p:cTn id="13" presetID="1" presetClass="entr" presetSubtype="0" fill="hold" nodeType="clickEffect">
+                                  <p:stCondLst>
+                                    <p:cond delay="0"/>
+                                  </p:stCondLst>
+                                  <p:childTnLst>
+                                    <p:set>
+                                      <p:cBhvr>
+                                        <p:cTn id="14" dur="1" fill="hold">
                                           <p:stCondLst>
                                             <p:cond delay="0"/>
                                           </p:stCondLst>
@@ -10381,19 +10430,15 @@
           <a:p>
             <a:r>
               <a:rPr lang="bg-BG" dirty="0"/>
-              <a:t>Въвеждане на </a:t>
-            </a:r>
-            <a:r>
-              <a:rPr lang="bg-BG" dirty="0" smtClean="0"/>
-              <a:t>данни</a:t>
-            </a:r>
-            <a:r>
-              <a:rPr lang="en-US" dirty="0" smtClean="0"/>
+              <a:t>Въвеждане на данни</a:t>
+            </a:r>
+            <a:r>
+              <a:rPr lang="en-US" dirty="0"/>
               <a:t> – </a:t>
             </a:r>
             <a:r>
-              <a:rPr lang="bg-BG" dirty="0" smtClean="0"/>
-              <a:t>Видео</a:t>
+              <a:rPr lang="bg-BG" dirty="0"/>
+              <a:t>видео</a:t>
             </a:r>
             <a:endParaRPr lang="en-US" dirty="0"/>
           </a:p>
@@ -10447,13 +10492,6 @@
       <p:transition spd="slow" advClick="0" advTm="5000"/>
     </mc:Fallback>
   </mc:AlternateContent>
-  <p:timing>
-    <p:tnLst>
-      <p:par>
-        <p:cTn id="1" dur="indefinite" restart="never" nodeType="tmRoot"/>
-      </p:par>
-    </p:tnLst>
-  </p:timing>
 </p:sld>
 </file>
 
@@ -10510,97 +10548,121 @@
         </p:nvSpPr>
         <p:spPr/>
         <p:txBody>
-          <a:bodyPr/>
+          <a:bodyPr>
+            <a:normAutofit/>
+          </a:bodyPr>
           <a:lstStyle/>
           <a:p>
-            <a:r>
-              <a:rPr lang="bg-BG" dirty="0" smtClean="0"/>
+            <a:pPr>
+              <a:lnSpc>
+                <a:spcPct val="110000"/>
+              </a:lnSpc>
+            </a:pPr>
+            <a:r>
+              <a:rPr lang="bg-BG" sz="3800" dirty="0"/>
               <a:t>Редактиране на данни </a:t>
             </a:r>
             <a:r>
-              <a:rPr lang="bg-BG" b="1" dirty="0" smtClean="0"/>
+              <a:rPr lang="bg-BG" sz="3800" b="1" dirty="0"/>
               <a:t>включва</a:t>
             </a:r>
             <a:r>
-              <a:rPr lang="bg-BG" dirty="0" smtClean="0"/>
+              <a:rPr lang="bg-BG" sz="3800" dirty="0"/>
               <a:t>:</a:t>
             </a:r>
           </a:p>
           <a:p>
-            <a:pPr lvl="1"/>
-            <a:r>
-              <a:rPr lang="bg-BG" b="1" dirty="0" smtClean="0"/>
+            <a:pPr lvl="1">
+              <a:lnSpc>
+                <a:spcPct val="110000"/>
+              </a:lnSpc>
+            </a:pPr>
+            <a:r>
+              <a:rPr lang="bg-BG" sz="3600" b="1" dirty="0"/>
               <a:t>Добавяне</a:t>
             </a:r>
             <a:r>
-              <a:rPr lang="bg-BG" dirty="0" smtClean="0"/>
+              <a:rPr lang="bg-BG" sz="3600" dirty="0"/>
               <a:t>, </a:t>
             </a:r>
             <a:r>
-              <a:rPr lang="bg-BG" b="1" dirty="0" smtClean="0"/>
+              <a:rPr lang="bg-BG" sz="3600" b="1" dirty="0"/>
               <a:t>изтриване</a:t>
             </a:r>
             <a:r>
-              <a:rPr lang="bg-BG" dirty="0" smtClean="0"/>
-              <a:t>, </a:t>
-            </a:r>
-            <a:r>
-              <a:rPr lang="bg-BG" b="1" dirty="0" smtClean="0"/>
+              <a:rPr lang="bg-BG" sz="3600" dirty="0"/>
+              <a:t> и </a:t>
+            </a:r>
+            <a:r>
+              <a:rPr lang="bg-BG" sz="3600" b="1" dirty="0"/>
               <a:t>разместване</a:t>
             </a:r>
             <a:r>
-              <a:rPr lang="bg-BG" dirty="0" smtClean="0"/>
-              <a:t> </a:t>
-            </a:r>
-            <a:r>
-              <a:rPr lang="bg-BG" b="1" dirty="0" smtClean="0"/>
-              <a:t>на символи</a:t>
-            </a:r>
-          </a:p>
-          <a:p>
-            <a:r>
-              <a:rPr lang="bg-BG" dirty="0" smtClean="0"/>
+              <a:rPr lang="bg-BG" sz="3600" dirty="0"/>
+              <a:t> на символи</a:t>
+            </a:r>
+          </a:p>
+          <a:p>
+            <a:pPr>
+              <a:lnSpc>
+                <a:spcPct val="110000"/>
+              </a:lnSpc>
+            </a:pPr>
+            <a:r>
+              <a:rPr lang="bg-BG" sz="3800" dirty="0"/>
               <a:t>Редактирането на данни става чрез:</a:t>
             </a:r>
           </a:p>
           <a:p>
-            <a:pPr lvl="1"/>
-            <a:r>
-              <a:rPr lang="bg-BG" dirty="0" smtClean="0"/>
+            <a:pPr lvl="1">
+              <a:lnSpc>
+                <a:spcPct val="110000"/>
+              </a:lnSpc>
+            </a:pPr>
+            <a:r>
+              <a:rPr lang="bg-BG" sz="3600" dirty="0"/>
               <a:t>Щракване </a:t>
             </a:r>
             <a:r>
-              <a:rPr lang="bg-BG" b="1" dirty="0" smtClean="0"/>
+              <a:rPr lang="bg-BG" sz="3600" b="1" dirty="0"/>
               <a:t>двукратно в клетката</a:t>
             </a:r>
           </a:p>
           <a:p>
-            <a:pPr lvl="1"/>
-            <a:r>
-              <a:rPr lang="bg-BG" dirty="0" smtClean="0"/>
+            <a:pPr lvl="1">
+              <a:lnSpc>
+                <a:spcPct val="110000"/>
+              </a:lnSpc>
+            </a:pPr>
+            <a:r>
+              <a:rPr lang="bg-BG" sz="3600" dirty="0"/>
               <a:t>Писане в </a:t>
             </a:r>
             <a:r>
-              <a:rPr lang="bg-BG" b="1" dirty="0" smtClean="0"/>
+              <a:rPr lang="bg-BG" sz="3600" b="1" dirty="0"/>
               <a:t>реда за редактиране</a:t>
             </a:r>
           </a:p>
           <a:p>
-            <a:pPr lvl="1"/>
-            <a:r>
-              <a:rPr lang="bg-BG" b="1" dirty="0" smtClean="0"/>
+            <a:pPr lvl="1">
+              <a:lnSpc>
+                <a:spcPct val="110000"/>
+              </a:lnSpc>
+            </a:pPr>
+            <a:r>
+              <a:rPr lang="bg-BG" sz="3600" b="1" dirty="0"/>
               <a:t>Натискане</a:t>
             </a:r>
             <a:r>
-              <a:rPr lang="bg-BG" dirty="0" smtClean="0"/>
+              <a:rPr lang="bg-BG" sz="3600" dirty="0"/>
               <a:t> на клавиша </a:t>
             </a:r>
             <a:r>
-              <a:rPr lang="en-US" dirty="0" smtClean="0"/>
+              <a:rPr lang="en-US" sz="3600" dirty="0"/>
               <a:t>[</a:t>
             </a:r>
             <a:r>
-              <a:rPr lang="en-US" b="1" dirty="0" smtClean="0">
+              <a:rPr lang="en-US" sz="3600" b="1" dirty="0">
                 <a:solidFill>
                   <a:schemeClr val="bg1"/>
                 </a:solidFill>
@@ -10608,10 +10670,9 @@
               <a:t>F2</a:t>
             </a:r>
             <a:r>
-              <a:rPr lang="en-US" dirty="0" smtClean="0"/>
+              <a:rPr lang="en-US" sz="3600" dirty="0"/>
               <a:t>]</a:t>
             </a:r>
-            <a:endParaRPr lang="en-US" dirty="0"/>
           </a:p>
         </p:txBody>
       </p:sp>
@@ -10631,7 +10692,7 @@
           <a:lstStyle/>
           <a:p>
             <a:r>
-              <a:rPr lang="bg-BG" dirty="0" smtClean="0"/>
+              <a:rPr lang="bg-BG" dirty="0"/>
               <a:t>Редактиране на данни</a:t>
             </a:r>
             <a:endParaRPr lang="en-US" dirty="0"/>
@@ -10692,6 +10753,55 @@
                                         <p:tgtEl>
                                           <p:spTgt spid="3">
                                             <p:txEl>
+                                              <p:pRg st="1" end="1"/>
+                                            </p:txEl>
+                                          </p:spTgt>
+                                        </p:tgtEl>
+                                        <p:attrNameLst>
+                                          <p:attrName>style.visibility</p:attrName>
+                                        </p:attrNameLst>
+                                      </p:cBhvr>
+                                      <p:to>
+                                        <p:strVal val="visible"/>
+                                      </p:to>
+                                    </p:set>
+                                  </p:childTnLst>
+                                </p:cTn>
+                              </p:par>
+                            </p:childTnLst>
+                          </p:cTn>
+                        </p:par>
+                      </p:childTnLst>
+                    </p:cTn>
+                  </p:par>
+                  <p:par>
+                    <p:cTn id="7" fill="hold">
+                      <p:stCondLst>
+                        <p:cond delay="indefinite"/>
+                      </p:stCondLst>
+                      <p:childTnLst>
+                        <p:par>
+                          <p:cTn id="8" fill="hold">
+                            <p:stCondLst>
+                              <p:cond delay="0"/>
+                            </p:stCondLst>
+                            <p:childTnLst>
+                              <p:par>
+                                <p:cTn id="9" presetID="1" presetClass="entr" presetSubtype="0" fill="hold" nodeType="clickEffect">
+                                  <p:stCondLst>
+                                    <p:cond delay="0"/>
+                                  </p:stCondLst>
+                                  <p:childTnLst>
+                                    <p:set>
+                                      <p:cBhvr>
+                                        <p:cTn id="10" dur="1" fill="hold">
+                                          <p:stCondLst>
+                                            <p:cond delay="0"/>
+                                          </p:stCondLst>
+                                        </p:cTn>
+                                        <p:tgtEl>
+                                          <p:spTgt spid="3">
+                                            <p:txEl>
                                               <p:pRg st="2" end="2"/>
                                             </p:txEl>
                                           </p:spTgt>
@@ -10707,15 +10817,33 @@
                                   </p:childTnLst>
                                 </p:cTn>
                               </p:par>
+                            </p:childTnLst>
+                          </p:cTn>
+                        </p:par>
+                      </p:childTnLst>
+                    </p:cTn>
+                  </p:par>
+                  <p:par>
+                    <p:cTn id="11" fill="hold">
+                      <p:stCondLst>
+                        <p:cond delay="indefinite"/>
+                      </p:stCondLst>
+                      <p:childTnLst>
+                        <p:par>
+                          <p:cTn id="12" fill="hold">
+                            <p:stCondLst>
+                              <p:cond delay="0"/>
+                            </p:stCondLst>
+                            <p:childTnLst>
                               <p:par>
-                                <p:cTn id="7" presetID="1" presetClass="entr" presetSubtype="0" fill="hold" nodeType="withEffect">
+                                <p:cTn id="13" presetID="1" presetClass="entr" presetSubtype="0" fill="hold" nodeType="clickEffect">
                                   <p:stCondLst>
                                     <p:cond delay="0"/>
                                   </p:stCondLst>
                                   <p:childTnLst>
                                     <p:set>
                                       <p:cBhvr>
-                                        <p:cTn id="8" dur="1" fill="hold">
+                                        <p:cTn id="14" dur="1" fill="hold">
                                           <p:stCondLst>
                                             <p:cond delay="0"/>
                                           </p:stCondLst>
@@ -10745,26 +10873,26 @@
                     </p:cTn>
                   </p:par>
                   <p:par>
-                    <p:cTn id="9" fill="hold">
+                    <p:cTn id="15" fill="hold">
                       <p:stCondLst>
                         <p:cond delay="indefinite"/>
                       </p:stCondLst>
                       <p:childTnLst>
                         <p:par>
-                          <p:cTn id="10" fill="hold">
+                          <p:cTn id="16" fill="hold">
                             <p:stCondLst>
                               <p:cond delay="0"/>
                             </p:stCondLst>
                             <p:childTnLst>
                               <p:par>
-                                <p:cTn id="11" presetID="1" presetClass="entr" presetSubtype="0" fill="hold" nodeType="clickEffect">
+                                <p:cTn id="17" presetID="1" presetClass="entr" presetSubtype="0" fill="hold" nodeType="clickEffect">
                                   <p:stCondLst>
                                     <p:cond delay="0"/>
                                   </p:stCondLst>
                                   <p:childTnLst>
                                     <p:set>
                                       <p:cBhvr>
-                                        <p:cTn id="12" dur="1" fill="hold">
+                                        <p:cTn id="18" dur="1" fill="hold">
                                           <p:stCondLst>
                                             <p:cond delay="0"/>
                                           </p:stCondLst>
@@ -10794,26 +10922,26 @@
                     </p:cTn>
                   </p:par>
                   <p:par>
-                    <p:cTn id="13" fill="hold">
+                    <p:cTn id="19" fill="hold">
                       <p:stCondLst>
                         <p:cond delay="indefinite"/>
                       </p:stCondLst>
                       <p:childTnLst>
                         <p:par>
-                          <p:cTn id="14" fill="hold">
+                          <p:cTn id="20" fill="hold">
                             <p:stCondLst>
                               <p:cond delay="0"/>
                             </p:stCondLst>
                             <p:childTnLst>
                               <p:par>
-                                <p:cTn id="15" presetID="1" presetClass="entr" presetSubtype="0" fill="hold" nodeType="clickEffect">
+                                <p:cTn id="21" presetID="1" presetClass="entr" presetSubtype="0" fill="hold" nodeType="clickEffect">
                                   <p:stCondLst>
                                     <p:cond delay="0"/>
                                   </p:stCondLst>
                                   <p:childTnLst>
                                     <p:set>
                                       <p:cBhvr>
-                                        <p:cTn id="16" dur="1" fill="hold">
+                                        <p:cTn id="22" dur="1" fill="hold">
                                           <p:stCondLst>
                                             <p:cond delay="0"/>
                                           </p:stCondLst>
@@ -10925,11 +11053,7 @@
           <a:p>
             <a:r>
               <a:rPr lang="bg-BG" dirty="0"/>
-              <a:t>Редактиране на </a:t>
-            </a:r>
-            <a:r>
-              <a:rPr lang="bg-BG" dirty="0" smtClean="0"/>
-              <a:t>данни – Видео</a:t>
+              <a:t>Редактиране на данни – видео</a:t>
             </a:r>
             <a:endParaRPr lang="en-US" dirty="0"/>
           </a:p>
@@ -10983,13 +11107,6 @@
       <p:transition spd="slow" advClick="0" advTm="5000"/>
     </mc:Fallback>
   </mc:AlternateContent>
-  <p:timing>
-    <p:tnLst>
-      <p:par>
-        <p:cTn id="1" dur="indefinite" restart="never" nodeType="tmRoot"/>
-      </p:par>
-    </p:tnLst>
-  </p:timing>
 </p:sld>
 </file>
 
@@ -11712,20 +11829,12 @@
               <a:t> или </a:t>
             </a:r>
             <a:r>
-              <a:rPr lang="bg-BG" sz="2800" b="1" dirty="0" smtClean="0">
+              <a:rPr lang="bg-BG" sz="2800" b="1" dirty="0">
                 <a:solidFill>
                   <a:schemeClr val="bg2"/>
                 </a:solidFill>
               </a:rPr>
-              <a:t>указания, </a:t>
-            </a:r>
-            <a:r>
-              <a:rPr lang="bg-BG" sz="2800" dirty="0" smtClean="0">
-                <a:solidFill>
-                  <a:schemeClr val="bg2"/>
-                </a:solidFill>
-              </a:rPr>
-              <a:t>бработват </a:t>
+              <a:t>указания</a:t>
             </a:r>
             <a:r>
               <a:rPr lang="bg-BG" sz="2800" dirty="0">
@@ -11733,17 +11842,9 @@
                   <a:schemeClr val="bg2"/>
                 </a:solidFill>
               </a:rPr>
-              <a:t>от човек или </a:t>
-            </a:r>
-            <a:r>
-              <a:rPr lang="bg-BG" sz="2800" dirty="0" smtClean="0">
-                <a:solidFill>
-                  <a:schemeClr val="bg2"/>
-                </a:solidFill>
-              </a:rPr>
-              <a:t>компютър</a:t>
-            </a:r>
-            <a:endParaRPr lang="bg-BG" sz="2800" b="1" dirty="0" smtClean="0">
+              <a:t>, които се обработват от човек или компютър</a:t>
+            </a:r>
+            <a:endParaRPr lang="bg-BG" sz="2800" b="1" dirty="0">
               <a:solidFill>
                 <a:schemeClr val="bg2"/>
               </a:solidFill>
@@ -11764,15 +11865,7 @@
                   <a:schemeClr val="bg2"/>
                 </a:solidFill>
               </a:rPr>
-              <a:t>Основни елементи на ел. </a:t>
-            </a:r>
-            <a:r>
-              <a:rPr lang="bg-BG" sz="2800" dirty="0" smtClean="0">
-                <a:solidFill>
-                  <a:schemeClr val="bg2"/>
-                </a:solidFill>
-              </a:rPr>
-              <a:t>таблица:</a:t>
+              <a:t>Основни елементи на ел. таблица:</a:t>
             </a:r>
           </a:p>
           <a:p>
@@ -11785,7 +11878,7 @@
               </a:buClr>
             </a:pPr>
             <a:r>
-              <a:rPr lang="bg-BG" sz="2600" b="1" dirty="0" smtClean="0">
+              <a:rPr lang="bg-BG" sz="2600" b="1" dirty="0">
                 <a:solidFill>
                   <a:schemeClr val="bg2"/>
                 </a:solidFill>
@@ -11803,18 +11896,13 @@
               </a:buClr>
             </a:pPr>
             <a:r>
-              <a:rPr lang="bg-BG" sz="2600" b="1" dirty="0" smtClean="0">
+              <a:rPr lang="bg-BG" sz="2600" b="1" dirty="0">
                 <a:solidFill>
                   <a:schemeClr val="bg2"/>
                 </a:solidFill>
               </a:rPr>
               <a:t>Ред</a:t>
             </a:r>
-            <a:endParaRPr lang="bg-BG" sz="2600" b="1" dirty="0">
-              <a:solidFill>
-                <a:schemeClr val="bg2"/>
-              </a:solidFill>
-            </a:endParaRPr>
           </a:p>
           <a:p>
             <a:pPr marL="888666" lvl="1" indent="-355600">
@@ -11826,7 +11914,7 @@
               </a:buClr>
             </a:pPr>
             <a:r>
-              <a:rPr lang="bg-BG" sz="2600" b="1" dirty="0" smtClean="0">
+              <a:rPr lang="bg-BG" sz="2600" b="1" dirty="0">
                 <a:solidFill>
                   <a:schemeClr val="bg2"/>
                 </a:solidFill>
@@ -11844,7 +11932,7 @@
               </a:buClr>
             </a:pPr>
             <a:r>
-              <a:rPr lang="bg-BG" sz="2600" b="1" dirty="0" smtClean="0">
+              <a:rPr lang="bg-BG" sz="2600" b="1" dirty="0">
                 <a:solidFill>
                   <a:schemeClr val="bg2"/>
                 </a:solidFill>
@@ -11862,7 +11950,7 @@
               </a:buClr>
             </a:pPr>
             <a:r>
-              <a:rPr lang="en-US" sz="2800" b="1" dirty="0" smtClean="0">
+              <a:rPr lang="en-US" sz="2800" b="1" dirty="0">
                 <a:solidFill>
                   <a:schemeClr val="bg1">
                     <a:lumMod val="60000"/>
@@ -11873,7 +11961,7 @@
               <a:t>MS Excel </a:t>
             </a:r>
             <a:r>
-              <a:rPr lang="en-US" sz="2800" dirty="0" smtClean="0">
+              <a:rPr lang="en-US" sz="2800" dirty="0">
                 <a:solidFill>
                   <a:schemeClr val="bg2"/>
                 </a:solidFill>
@@ -11881,7 +11969,7 @@
               <a:t>– </a:t>
             </a:r>
             <a:r>
-              <a:rPr lang="bg-BG" sz="2800" dirty="0" smtClean="0">
+              <a:rPr lang="bg-BG" sz="2800" dirty="0">
                 <a:solidFill>
                   <a:schemeClr val="bg2"/>
                 </a:solidFill>
@@ -11889,7 +11977,7 @@
               <a:t>програма за </a:t>
             </a:r>
             <a:r>
-              <a:rPr lang="bg-BG" sz="2800" b="1" dirty="0" smtClean="0">
+              <a:rPr lang="bg-BG" sz="2800" b="1" dirty="0">
                 <a:solidFill>
                   <a:schemeClr val="bg2"/>
                 </a:solidFill>
@@ -11897,7 +11985,7 @@
               <a:t>въвеждане</a:t>
             </a:r>
             <a:r>
-              <a:rPr lang="bg-BG" sz="2800" dirty="0" smtClean="0">
+              <a:rPr lang="bg-BG" sz="2800" dirty="0">
                 <a:solidFill>
                   <a:schemeClr val="bg2"/>
                 </a:solidFill>
@@ -11905,7 +11993,7 @@
               <a:t> и </a:t>
             </a:r>
             <a:r>
-              <a:rPr lang="bg-BG" sz="2800" b="1" dirty="0" smtClean="0">
+              <a:rPr lang="bg-BG" sz="2800" b="1" dirty="0">
                 <a:solidFill>
                   <a:schemeClr val="bg2"/>
                 </a:solidFill>
@@ -11913,7 +12001,7 @@
               <a:t>обработване</a:t>
             </a:r>
             <a:r>
-              <a:rPr lang="bg-BG" sz="2800" dirty="0" smtClean="0">
+              <a:rPr lang="bg-BG" sz="2800" dirty="0">
                 <a:solidFill>
                   <a:schemeClr val="bg2"/>
                 </a:solidFill>
@@ -11921,18 +12009,13 @@
               <a:t> на информация в </a:t>
             </a:r>
             <a:r>
-              <a:rPr lang="bg-BG" sz="2800" b="1" dirty="0" smtClean="0">
+              <a:rPr lang="bg-BG" sz="2800" b="1" dirty="0">
                 <a:solidFill>
                   <a:schemeClr val="bg2"/>
                 </a:solidFill>
               </a:rPr>
               <a:t>табличен вид</a:t>
             </a:r>
-            <a:endParaRPr lang="bg-BG" sz="2800" b="1" dirty="0">
-              <a:solidFill>
-                <a:schemeClr val="bg2"/>
-              </a:solidFill>
-            </a:endParaRPr>
           </a:p>
         </p:txBody>
       </p:sp>
@@ -12431,57 +12514,57 @@
           <a:lstStyle/>
           <a:p>
             <a:r>
-              <a:rPr lang="bg-BG" dirty="0" smtClean="0"/>
+              <a:rPr lang="bg-BG" dirty="0"/>
               <a:t>͏</a:t>
             </a:r>
             <a:r>
-              <a:rPr lang="bg-BG" b="1" dirty="0" smtClean="0"/>
+              <a:rPr lang="bg-BG" b="1" dirty="0"/>
               <a:t>Електронни таблици</a:t>
             </a:r>
           </a:p>
           <a:p>
             <a:r>
-              <a:rPr lang="bg-BG" dirty="0" smtClean="0"/>
+              <a:rPr lang="bg-BG" dirty="0"/>
               <a:t>͏</a:t>
             </a:r>
             <a:r>
-              <a:rPr lang="bg-BG" b="1" dirty="0" smtClean="0"/>
+              <a:rPr lang="bg-BG" b="1" dirty="0"/>
               <a:t>Елементи</a:t>
             </a:r>
             <a:r>
-              <a:rPr lang="bg-BG" dirty="0" smtClean="0"/>
+              <a:rPr lang="bg-BG" dirty="0"/>
               <a:t> на електронна таблица</a:t>
             </a:r>
           </a:p>
           <a:p>
             <a:r>
-              <a:rPr lang="en-US" dirty="0" smtClean="0"/>
+              <a:rPr lang="en-US" dirty="0"/>
               <a:t>͏</a:t>
             </a:r>
             <a:r>
-              <a:rPr lang="en-US" b="1" dirty="0" smtClean="0"/>
+              <a:rPr lang="en-US" b="1" dirty="0"/>
               <a:t>Microsoft Excel</a:t>
             </a:r>
           </a:p>
           <a:p>
             <a:r>
-              <a:rPr lang="bg-BG" dirty="0" smtClean="0"/>
+              <a:rPr lang="bg-BG" dirty="0"/>
               <a:t>͏</a:t>
             </a:r>
             <a:r>
-              <a:rPr lang="bg-BG" b="1" dirty="0" smtClean="0"/>
+              <a:rPr lang="bg-BG" b="1" dirty="0"/>
               <a:t>Редактиране</a:t>
             </a:r>
             <a:r>
-              <a:rPr lang="bg-BG" dirty="0" smtClean="0"/>
+              <a:rPr lang="bg-BG" dirty="0"/>
               <a:t> и </a:t>
             </a:r>
             <a:r>
-              <a:rPr lang="bg-BG" b="1" dirty="0" smtClean="0"/>
+              <a:rPr lang="bg-BG" b="1" dirty="0"/>
               <a:t>въвеждане</a:t>
             </a:r>
             <a:r>
-              <a:rPr lang="bg-BG" dirty="0" smtClean="0"/>
+              <a:rPr lang="bg-BG" dirty="0"/>
               <a:t> на данни</a:t>
             </a:r>
             <a:endParaRPr lang="en-US" dirty="0"/>
@@ -12877,7 +12960,7 @@
                 <a:hlinkClick r:id="rId3">
                   <a:extLst>
                     <a:ext uri="{A12FA001-AC4F-418D-AE19-62706E023703}">
-                      <ahyp:hlinkClr xmlns:ahyp="http://schemas.microsoft.com/office/drawing/2018/hyperlinkcolor" xmlns="" val="tx"/>
+                      <ahyp:hlinkClr xmlns:ahyp="http://schemas.microsoft.com/office/drawing/2018/hyperlinkcolor" val="tx"/>
                     </a:ext>
                   </a:extLst>
                 </a:hlinkClick>
@@ -12950,13 +13033,6 @@
       <p:transition spd="slow" advClick="0" advTm="5000"/>
     </mc:Fallback>
   </mc:AlternateContent>
-  <p:timing>
-    <p:tnLst>
-      <p:par>
-        <p:cTn id="1" dur="indefinite" restart="never" nodeType="tmRoot"/>
-      </p:par>
-    </p:tnLst>
-  </p:timing>
 </p:sld>
 </file>
 
@@ -13376,7 +13452,7 @@
           <a:lstStyle/>
           <a:p>
             <a:r>
-              <a:rPr lang="bg-BG" dirty="0" smtClean="0"/>
+              <a:rPr lang="bg-BG" dirty="0"/>
               <a:t>Структуриране на данни</a:t>
             </a:r>
             <a:endParaRPr lang="en-US" dirty="0"/>
@@ -13400,11 +13476,7 @@
           <a:p>
             <a:r>
               <a:rPr lang="bg-BG" dirty="0"/>
-              <a:t>Електронни </a:t>
-            </a:r>
-            <a:r>
-              <a:rPr lang="bg-BG" dirty="0" smtClean="0"/>
-              <a:t>таблици</a:t>
+              <a:t>Електронни таблици</a:t>
             </a:r>
             <a:endParaRPr lang="en-US" dirty="0"/>
           </a:p>
@@ -13479,6 +13551,68 @@
           </a:ln>
         </p:spPr>
       </p:pic>
+      <p:sp>
+        <p:nvSpPr>
+          <p:cNvPr id="3" name="TextBox 2">
+            <a:extLst>
+              <a:ext uri="{FF2B5EF4-FFF2-40B4-BE49-F238E27FC236}">
+                <a16:creationId xmlns:a16="http://schemas.microsoft.com/office/drawing/2014/main" id="{CA89044E-0B78-6135-8F1A-1260C20F1A8E}"/>
+              </a:ext>
+            </a:extLst>
+          </p:cNvPr>
+          <p:cNvSpPr txBox="1"/>
+          <p:nvPr/>
+        </p:nvSpPr>
+        <p:spPr>
+          <a:xfrm>
+            <a:off x="5286000" y="2567638"/>
+            <a:ext cx="5757630" cy="861362"/>
+          </a:xfrm>
+          <a:prstGeom prst="rect">
+            <a:avLst/>
+          </a:prstGeom>
+          <a:ln/>
+        </p:spPr>
+        <p:style>
+          <a:lnRef idx="2">
+            <a:schemeClr val="accent2"/>
+          </a:lnRef>
+          <a:fillRef idx="1">
+            <a:schemeClr val="lt1"/>
+          </a:fillRef>
+          <a:effectRef idx="0">
+            <a:schemeClr val="accent2"/>
+          </a:effectRef>
+          <a:fontRef idx="minor">
+            <a:schemeClr val="dk1"/>
+          </a:fontRef>
+        </p:style>
+        <p:txBody>
+          <a:bodyPr vert="horz" wrap="none" lIns="144000" tIns="108000" rIns="144000" bIns="108000" rtlCol="0">
+            <a:spAutoFit/>
+          </a:bodyPr>
+          <a:lstStyle/>
+          <a:p>
+            <a:pPr algn="l" eaLnBrk="0" hangingPunct="0">
+              <a:lnSpc>
+                <a:spcPct val="110000"/>
+              </a:lnSpc>
+              <a:buClr>
+                <a:schemeClr val="accent5">
+                  <a:lumMod val="40000"/>
+                  <a:lumOff val="60000"/>
+                </a:schemeClr>
+              </a:buClr>
+              <a:buSzPct val="70000"/>
+            </a:pPr>
+            <a:r>
+              <a:rPr lang="en-US" sz="4000" b="1" dirty="0"/>
+              <a:t>TODO: change screenshot</a:t>
+            </a:r>
+            <a:endParaRPr lang="bg-BG" sz="4000" b="1" dirty="0"/>
+          </a:p>
+        </p:txBody>
+      </p:sp>
     </p:spTree>
     <p:extLst>
       <p:ext uri="{BB962C8B-B14F-4D97-AF65-F5344CB8AC3E}">
@@ -13497,13 +13631,6 @@
       <p:transition spd="slow" advClick="0" advTm="5000"/>
     </mc:Fallback>
   </mc:AlternateContent>
-  <p:timing>
-    <p:tnLst>
-      <p:par>
-        <p:cTn id="1" dur="indefinite" restart="never" nodeType="tmRoot"/>
-      </p:par>
-    </p:tnLst>
-  </p:timing>
 </p:sld>
 </file>
 
@@ -13545,62 +13672,58 @@
           <a:lstStyle/>
           <a:p>
             <a:r>
-              <a:rPr lang="bg-BG" dirty="0" smtClean="0"/>
+              <a:rPr lang="bg-BG" dirty="0"/>
               <a:t>͏</a:t>
             </a:r>
             <a:r>
-              <a:rPr lang="bg-BG" b="1" dirty="0" smtClean="0"/>
+              <a:rPr lang="bg-BG" b="1" dirty="0">
+                <a:solidFill>
+                  <a:schemeClr val="bg1"/>
+                </a:solidFill>
+              </a:rPr>
               <a:t>Данни</a:t>
             </a:r>
             <a:r>
-              <a:rPr lang="bg-BG" dirty="0" smtClean="0"/>
+              <a:rPr lang="bg-BG" dirty="0"/>
               <a:t> – </a:t>
             </a:r>
             <a:r>
-              <a:rPr lang="bg-BG" b="1" dirty="0" smtClean="0"/>
+              <a:rPr lang="bg-BG" b="1" dirty="0"/>
               <a:t>факти</a:t>
             </a:r>
             <a:r>
-              <a:rPr lang="bg-BG" dirty="0" smtClean="0"/>
+              <a:rPr lang="bg-BG" dirty="0"/>
               <a:t>, </a:t>
             </a:r>
             <a:r>
-              <a:rPr lang="bg-BG" b="1" dirty="0" smtClean="0"/>
+              <a:rPr lang="bg-BG" b="1" dirty="0"/>
               <a:t>понятия</a:t>
             </a:r>
             <a:r>
-              <a:rPr lang="bg-BG" dirty="0" smtClean="0"/>
+              <a:rPr lang="bg-BG" dirty="0"/>
               <a:t> или </a:t>
             </a:r>
             <a:r>
-              <a:rPr lang="bg-BG" b="1" dirty="0" smtClean="0"/>
+              <a:rPr lang="bg-BG" b="1" dirty="0"/>
               <a:t>указания</a:t>
             </a:r>
             <a:r>
-              <a:rPr lang="bg-BG" dirty="0" smtClean="0"/>
-              <a:t>, които се използват и бработват от </a:t>
-            </a:r>
-            <a:r>
               <a:rPr lang="bg-BG" dirty="0"/>
-              <a:t>човек или </a:t>
-            </a:r>
-            <a:r>
-              <a:rPr lang="bg-BG" dirty="0" smtClean="0"/>
-              <a:t>компютър</a:t>
+              <a:t>, които се използват и обработват от човек или компютър</a:t>
             </a:r>
           </a:p>
           <a:p>
             <a:pPr lvl="1"/>
             <a:r>
-              <a:rPr lang="bg-BG" b="1" dirty="0" smtClean="0"/>
+              <a:rPr lang="bg-BG" b="1" dirty="0"/>
               <a:t>Преобразуваните данни </a:t>
             </a:r>
             <a:r>
-              <a:rPr lang="bg-BG" dirty="0" smtClean="0"/>
+              <a:rPr lang="bg-BG" dirty="0"/>
               <a:t>се превръщат в </a:t>
             </a:r>
             <a:r>
-              <a:rPr lang="bg-BG" b="1" dirty="0" smtClean="0">
+              <a:rPr lang="bg-BG" b="1" dirty="0">
                 <a:solidFill>
                   <a:schemeClr val="bg1"/>
                 </a:solidFill>
@@ -13626,7 +13749,7 @@
           <a:lstStyle/>
           <a:p>
             <a:r>
-              <a:rPr lang="bg-BG" dirty="0" smtClean="0"/>
+              <a:rPr lang="bg-BG" dirty="0"/>
               <a:t>Данни</a:t>
             </a:r>
             <a:endParaRPr lang="en-US" dirty="0"/>
@@ -13691,7 +13814,79 @@
   <p:timing>
     <p:tnLst>
       <p:par>
-        <p:cTn id="1" dur="indefinite" restart="never" nodeType="tmRoot"/>
+        <p:cTn id="1" dur="indefinite" restart="never" nodeType="tmRoot">
+          <p:childTnLst>
+            <p:seq concurrent="1" nextAc="seek">
+              <p:cTn id="2" dur="indefinite" nodeType="mainSeq">
+                <p:childTnLst>
+                  <p:par>
+                    <p:cTn id="3" fill="hold">
+                      <p:stCondLst>
+                        <p:cond delay="indefinite"/>
+                      </p:stCondLst>
+                      <p:childTnLst>
+                        <p:par>
+                          <p:cTn id="4" fill="hold">
+                            <p:stCondLst>
+                              <p:cond delay="0"/>
+                            </p:stCondLst>
+                            <p:childTnLst>
+                              <p:par>
+                                <p:cTn id="5" presetID="1" presetClass="entr" presetSubtype="0" fill="hold" nodeType="clickEffect">
+                                  <p:stCondLst>
+                                    <p:cond delay="0"/>
+                                  </p:stCondLst>
+                                  <p:childTnLst>
+                                    <p:set>
+                                      <p:cBhvr>
+                                        <p:cTn id="6" dur="1" fill="hold">
+                                          <p:stCondLst>
+                                            <p:cond delay="0"/>
+                                          </p:stCondLst>
+                                        </p:cTn>
+                                        <p:tgtEl>
+                                          <p:spTgt spid="5">
+                                            <p:txEl>
+                                              <p:pRg st="1" end="1"/>
+                                            </p:txEl>
+                                          </p:spTgt>
+                                        </p:tgtEl>
+                                        <p:attrNameLst>
+                                          <p:attrName>style.visibility</p:attrName>
+                                        </p:attrNameLst>
+                                      </p:cBhvr>
+                                      <p:to>
+                                        <p:strVal val="visible"/>
+                                      </p:to>
+                                    </p:set>
+                                  </p:childTnLst>
+                                </p:cTn>
+                              </p:par>
+                            </p:childTnLst>
+                          </p:cTn>
+                        </p:par>
+                      </p:childTnLst>
+                    </p:cTn>
+                  </p:par>
+                </p:childTnLst>
+              </p:cTn>
+              <p:prevCondLst>
+                <p:cond evt="onPrev" delay="0">
+                  <p:tgtEl>
+                    <p:sldTgt/>
+                  </p:tgtEl>
+                </p:cond>
+              </p:prevCondLst>
+              <p:nextCondLst>
+                <p:cond evt="onNext" delay="0">
+                  <p:tgtEl>
+                    <p:sldTgt/>
+                  </p:tgtEl>
+                </p:cond>
+              </p:nextCondLst>
+            </p:seq>
+          </p:childTnLst>
+        </p:cTn>
       </p:par>
     </p:tnLst>
   </p:timing>
@@ -13754,26 +13949,39 @@
           <a:bodyPr/>
           <a:lstStyle/>
           <a:p>
-            <a:r>
-              <a:rPr lang="bg-BG" b="1" dirty="0" smtClean="0"/>
-              <a:t>Електронни таблици </a:t>
-            </a:r>
-            <a:r>
-              <a:rPr lang="bg-BG" dirty="0" smtClean="0"/>
+            <a:pPr>
+              <a:buClr>
+                <a:schemeClr val="tx1"/>
+              </a:buClr>
+            </a:pPr>
+            <a:r>
+              <a:rPr lang="bg-BG" b="1" dirty="0">
+                <a:solidFill>
+                  <a:schemeClr val="bg1"/>
+                </a:solidFill>
+              </a:rPr>
+              <a:t>Електронни таблици</a:t>
+            </a:r>
+            <a:r>
+              <a:rPr lang="bg-BG" b="1" dirty="0"/>
+              <a:t> </a:t>
+            </a:r>
+            <a:r>
+              <a:rPr lang="bg-BG" dirty="0"/>
               <a:t>– </a:t>
             </a:r>
             <a:r>
-              <a:rPr lang="bg-BG" b="1" dirty="0" smtClean="0"/>
+              <a:rPr lang="bg-BG" b="1" dirty="0"/>
               <a:t>структурирана</a:t>
             </a:r>
             <a:r>
-              <a:rPr lang="bg-BG" dirty="0" smtClean="0"/>
+              <a:rPr lang="bg-BG" dirty="0"/>
               <a:t> информация </a:t>
             </a:r>
           </a:p>
           <a:p>
             <a:r>
-              <a:rPr lang="bg-BG" dirty="0" smtClean="0"/>
+              <a:rPr lang="bg-BG" dirty="0"/>
               <a:t>Предимства:</a:t>
             </a:r>
           </a:p>
@@ -13803,50 +14011,50 @@
           <a:p>
             <a:pPr lvl="1"/>
             <a:r>
-              <a:rPr lang="bg-BG" dirty="0" smtClean="0"/>
-              <a:t>Извършване на </a:t>
-            </a:r>
-            <a:r>
-              <a:rPr lang="bg-BG" b="1" dirty="0" smtClean="0"/>
+              <a:rPr lang="bg-BG" dirty="0"/>
+              <a:t>Позволяват извършване на </a:t>
+            </a:r>
+            <a:r>
+              <a:rPr lang="bg-BG" b="1" dirty="0"/>
               <a:t>пресмятания</a:t>
             </a:r>
             <a:r>
-              <a:rPr lang="bg-BG" dirty="0" smtClean="0"/>
+              <a:rPr lang="bg-BG" dirty="0"/>
               <a:t> с помощта на </a:t>
             </a:r>
             <a:r>
-              <a:rPr lang="bg-BG" b="1" dirty="0" smtClean="0"/>
+              <a:rPr lang="bg-BG" b="1" dirty="0"/>
               <a:t>формули</a:t>
             </a:r>
           </a:p>
           <a:p>
             <a:pPr lvl="1"/>
             <a:r>
-              <a:rPr lang="bg-BG" dirty="0" smtClean="0"/>
+              <a:rPr lang="bg-BG" dirty="0"/>
               <a:t>При </a:t>
             </a:r>
             <a:r>
-              <a:rPr lang="bg-BG" b="1" dirty="0" smtClean="0"/>
+              <a:rPr lang="bg-BG" b="1" dirty="0"/>
               <a:t>промяна</a:t>
             </a:r>
             <a:r>
-              <a:rPr lang="bg-BG" dirty="0" smtClean="0"/>
-              <a:t> на първоначално въведените числови данни компютърът </a:t>
-            </a:r>
-            <a:r>
-              <a:rPr lang="bg-BG" b="1" dirty="0" smtClean="0"/>
+              <a:rPr lang="bg-BG" dirty="0"/>
+              <a:t> на първоначално въведените данни компютърът </a:t>
+            </a:r>
+            <a:r>
+              <a:rPr lang="bg-BG" b="1" dirty="0"/>
               <a:t>автоматично</a:t>
             </a:r>
             <a:r>
-              <a:rPr lang="bg-BG" dirty="0" smtClean="0"/>
+              <a:rPr lang="bg-BG" dirty="0"/>
               <a:t> </a:t>
             </a:r>
             <a:r>
-              <a:rPr lang="bg-BG" b="1" dirty="0" smtClean="0"/>
+              <a:rPr lang="bg-BG" b="1" dirty="0"/>
               <a:t>преизчислява</a:t>
             </a:r>
             <a:r>
-              <a:rPr lang="bg-BG" dirty="0" smtClean="0"/>
+              <a:rPr lang="bg-BG" dirty="0"/>
               <a:t> резултатите</a:t>
             </a:r>
           </a:p>
@@ -13871,7 +14079,7 @@
           <a:lstStyle/>
           <a:p>
             <a:r>
-              <a:rPr lang="bg-BG" dirty="0" smtClean="0"/>
+              <a:rPr lang="bg-BG" dirty="0"/>
               <a:t>Електронни таблици</a:t>
             </a:r>
             <a:endParaRPr lang="en-US" dirty="0"/>
@@ -14146,11 +14354,7 @@
           <a:p>
             <a:r>
               <a:rPr lang="bg-BG" dirty="0"/>
-              <a:t>Елементи на електронна </a:t>
-            </a:r>
-            <a:r>
-              <a:rPr lang="bg-BG" dirty="0" smtClean="0"/>
-              <a:t>таблица</a:t>
+              <a:t>Елементи на електронна таблица</a:t>
             </a:r>
             <a:endParaRPr lang="en-US" dirty="0"/>
           </a:p>
@@ -14188,6 +14392,68 @@
           </a:p>
         </p:txBody>
       </p:sp>
+      <p:sp>
+        <p:nvSpPr>
+          <p:cNvPr id="3" name="TextBox 2">
+            <a:extLst>
+              <a:ext uri="{FF2B5EF4-FFF2-40B4-BE49-F238E27FC236}">
+                <a16:creationId xmlns:a16="http://schemas.microsoft.com/office/drawing/2014/main" id="{2088FA1C-071A-1D3E-6178-5B42F9D71329}"/>
+              </a:ext>
+            </a:extLst>
+          </p:cNvPr>
+          <p:cNvSpPr txBox="1"/>
+          <p:nvPr/>
+        </p:nvSpPr>
+        <p:spPr>
+          <a:xfrm>
+            <a:off x="5801878" y="2484000"/>
+            <a:ext cx="4229391" cy="861362"/>
+          </a:xfrm>
+          <a:prstGeom prst="rect">
+            <a:avLst/>
+          </a:prstGeom>
+          <a:ln/>
+        </p:spPr>
+        <p:style>
+          <a:lnRef idx="2">
+            <a:schemeClr val="accent2"/>
+          </a:lnRef>
+          <a:fillRef idx="1">
+            <a:schemeClr val="lt1"/>
+          </a:fillRef>
+          <a:effectRef idx="0">
+            <a:schemeClr val="accent2"/>
+          </a:effectRef>
+          <a:fontRef idx="minor">
+            <a:schemeClr val="dk1"/>
+          </a:fontRef>
+        </p:style>
+        <p:txBody>
+          <a:bodyPr vert="horz" wrap="none" lIns="144000" tIns="108000" rIns="144000" bIns="108000" rtlCol="0">
+            <a:spAutoFit/>
+          </a:bodyPr>
+          <a:lstStyle/>
+          <a:p>
+            <a:pPr algn="l" eaLnBrk="0" hangingPunct="0">
+              <a:lnSpc>
+                <a:spcPct val="110000"/>
+              </a:lnSpc>
+              <a:buClr>
+                <a:schemeClr val="accent5">
+                  <a:lumMod val="40000"/>
+                  <a:lumOff val="60000"/>
+                </a:schemeClr>
+              </a:buClr>
+              <a:buSzPct val="70000"/>
+            </a:pPr>
+            <a:r>
+              <a:rPr lang="en-US" sz="4000" b="1" dirty="0"/>
+              <a:t>TODO: add picture</a:t>
+            </a:r>
+            <a:endParaRPr lang="bg-BG" sz="4000" b="1" dirty="0"/>
+          </a:p>
+        </p:txBody>
+      </p:sp>
     </p:spTree>
     <p:extLst>
       <p:ext uri="{BB962C8B-B14F-4D97-AF65-F5344CB8AC3E}">
@@ -14206,13 +14472,6 @@
       <p:transition spd="slow" advClick="0" advTm="5000"/>
     </mc:Fallback>
   </mc:AlternateContent>
-  <p:timing>
-    <p:tnLst>
-      <p:par>
-        <p:cTn id="1" dur="indefinite" restart="never" nodeType="tmRoot"/>
-      </p:par>
-    </p:tnLst>
-  </p:timing>
 </p:sld>
 </file>
 
@@ -14249,180 +14508,176 @@
           <a:lstStyle/>
           <a:p>
             <a:r>
-              <a:rPr lang="bg-BG" b="1" dirty="0" smtClean="0"/>
+              <a:rPr lang="bg-BG" b="1" dirty="0"/>
               <a:t>Клетка</a:t>
             </a:r>
             <a:r>
-              <a:rPr lang="bg-BG" dirty="0" smtClean="0"/>
+              <a:rPr lang="bg-BG" dirty="0"/>
               <a:t> – мястото, където се </a:t>
             </a:r>
             <a:r>
-              <a:rPr lang="bg-BG" b="1" dirty="0" smtClean="0"/>
+              <a:rPr lang="bg-BG" b="1" dirty="0"/>
               <a:t>въвеждат данните</a:t>
             </a:r>
           </a:p>
           <a:p>
             <a:r>
-              <a:rPr lang="bg-BG" b="1" dirty="0" smtClean="0"/>
+              <a:rPr lang="bg-BG" b="1" dirty="0"/>
               <a:t>Ред</a:t>
             </a:r>
             <a:r>
-              <a:rPr lang="bg-BG" dirty="0" smtClean="0"/>
+              <a:rPr lang="bg-BG" dirty="0"/>
               <a:t> – </a:t>
             </a:r>
             <a:r>
-              <a:rPr lang="bg-BG" b="1" dirty="0" smtClean="0"/>
+              <a:rPr lang="bg-BG" b="1" dirty="0"/>
               <a:t>хоризонтално</a:t>
             </a:r>
             <a:r>
-              <a:rPr lang="bg-BG" dirty="0" smtClean="0"/>
+              <a:rPr lang="bg-BG" dirty="0"/>
               <a:t> разположени клетки</a:t>
             </a:r>
           </a:p>
           <a:p>
             <a:pPr lvl="1"/>
             <a:r>
-              <a:rPr lang="bg-BG" dirty="0" smtClean="0"/>
+              <a:rPr lang="bg-BG" dirty="0"/>
               <a:t>Номерирани са с</a:t>
             </a:r>
             <a:r>
-              <a:rPr lang="en-US" dirty="0" smtClean="0"/>
+              <a:rPr lang="en-US" dirty="0"/>
               <a:t> </a:t>
             </a:r>
             <a:r>
-              <a:rPr lang="bg-BG" b="1" dirty="0" smtClean="0"/>
+              <a:rPr lang="bg-BG" b="1" dirty="0"/>
               <a:t>последователни числа </a:t>
             </a:r>
             <a:r>
-              <a:rPr lang="bg-BG" dirty="0" smtClean="0"/>
+              <a:rPr lang="bg-BG" dirty="0"/>
               <a:t>от </a:t>
             </a:r>
             <a:r>
-              <a:rPr lang="bg-BG" b="1" dirty="0" smtClean="0"/>
+              <a:rPr lang="bg-BG" b="1" dirty="0"/>
               <a:t>1</a:t>
             </a:r>
             <a:r>
-              <a:rPr lang="bg-BG" dirty="0" smtClean="0"/>
+              <a:rPr lang="bg-BG" dirty="0"/>
               <a:t> до </a:t>
             </a:r>
             <a:r>
-              <a:rPr lang="en-US" b="1" dirty="0" smtClean="0"/>
-              <a:t>1 048 576</a:t>
-            </a:r>
-            <a:r>
               <a:rPr lang="en-US" b="1" dirty="0"/>
-              <a:t> </a:t>
-            </a:r>
-            <a:endParaRPr lang="en-US" dirty="0" smtClean="0"/>
-          </a:p>
-          <a:p>
-            <a:r>
-              <a:rPr lang="bg-BG" b="1" dirty="0" smtClean="0"/>
+              <a:t>1 048 576 </a:t>
+            </a:r>
+            <a:endParaRPr lang="en-US" dirty="0"/>
+          </a:p>
+          <a:p>
+            <a:r>
+              <a:rPr lang="bg-BG" b="1" dirty="0"/>
               <a:t>Колона </a:t>
             </a:r>
             <a:r>
-              <a:rPr lang="bg-BG" dirty="0" smtClean="0"/>
+              <a:rPr lang="bg-BG" dirty="0"/>
               <a:t>–</a:t>
             </a:r>
             <a:r>
-              <a:rPr lang="bg-BG" b="1" dirty="0" smtClean="0"/>
+              <a:rPr lang="bg-BG" b="1" dirty="0"/>
               <a:t> вертикално</a:t>
             </a:r>
             <a:r>
-              <a:rPr lang="bg-BG" dirty="0" smtClean="0"/>
+              <a:rPr lang="bg-BG" dirty="0"/>
               <a:t> разположени клетки</a:t>
             </a:r>
           </a:p>
           <a:p>
             <a:pPr lvl="1"/>
             <a:r>
-              <a:rPr lang="bg-BG" dirty="0" smtClean="0"/>
+              <a:rPr lang="bg-BG" dirty="0"/>
               <a:t>Означават се с букви от </a:t>
             </a:r>
             <a:r>
-              <a:rPr lang="bg-BG" b="1" dirty="0" smtClean="0"/>
+              <a:rPr lang="bg-BG" b="1" dirty="0"/>
               <a:t>латинската азбука </a:t>
             </a:r>
             <a:r>
-              <a:rPr lang="bg-BG" dirty="0" smtClean="0"/>
+              <a:rPr lang="bg-BG" dirty="0"/>
               <a:t>(</a:t>
             </a:r>
             <a:r>
-              <a:rPr lang="en-US" b="1" dirty="0" smtClean="0"/>
+              <a:rPr lang="en-US" b="1" dirty="0"/>
               <a:t>A</a:t>
             </a:r>
             <a:r>
-              <a:rPr lang="en-US" dirty="0" smtClean="0"/>
+              <a:rPr lang="en-US" dirty="0"/>
               <a:t>, </a:t>
             </a:r>
             <a:r>
-              <a:rPr lang="en-US" b="1" dirty="0" smtClean="0"/>
+              <a:rPr lang="en-US" b="1" dirty="0"/>
               <a:t>B</a:t>
             </a:r>
             <a:r>
-              <a:rPr lang="en-US" dirty="0" smtClean="0"/>
+              <a:rPr lang="en-US" dirty="0"/>
               <a:t>…, </a:t>
             </a:r>
             <a:r>
-              <a:rPr lang="en-US" b="1" dirty="0" smtClean="0"/>
+              <a:rPr lang="en-US" b="1" dirty="0"/>
               <a:t>AA</a:t>
             </a:r>
             <a:r>
-              <a:rPr lang="en-US" dirty="0" smtClean="0"/>
+              <a:rPr lang="en-US" dirty="0"/>
               <a:t>, </a:t>
             </a:r>
             <a:r>
-              <a:rPr lang="en-US" b="1" dirty="0" smtClean="0"/>
+              <a:rPr lang="en-US" b="1" dirty="0"/>
               <a:t>AB</a:t>
             </a:r>
             <a:r>
-              <a:rPr lang="en-US" dirty="0" smtClean="0"/>
+              <a:rPr lang="en-US" dirty="0"/>
               <a:t>…</a:t>
             </a:r>
             <a:r>
-              <a:rPr lang="bg-BG" dirty="0" smtClean="0"/>
+              <a:rPr lang="bg-BG" dirty="0"/>
               <a:t>)</a:t>
             </a:r>
-            <a:endParaRPr lang="en-US" dirty="0" smtClean="0"/>
-          </a:p>
-          <a:p>
-            <a:r>
-              <a:rPr lang="bg-BG" b="1" dirty="0" smtClean="0"/>
+            <a:endParaRPr lang="en-US" dirty="0"/>
+          </a:p>
+          <a:p>
+            <a:r>
+              <a:rPr lang="bg-BG" b="1" dirty="0"/>
               <a:t>Адрес на клетка </a:t>
             </a:r>
             <a:r>
-              <a:rPr lang="bg-BG" dirty="0" smtClean="0"/>
+              <a:rPr lang="bg-BG" dirty="0"/>
               <a:t>– образува се от </a:t>
             </a:r>
             <a:r>
-              <a:rPr lang="bg-BG" b="1" dirty="0" smtClean="0"/>
+              <a:rPr lang="bg-BG" b="1" dirty="0"/>
               <a:t>пресичането</a:t>
             </a:r>
             <a:r>
-              <a:rPr lang="bg-BG" dirty="0" smtClean="0"/>
-              <a:t> на колоните и редовете  и имената им (</a:t>
-            </a:r>
-            <a:r>
-              <a:rPr lang="en-US" b="1" dirty="0" smtClean="0"/>
+              <a:rPr lang="bg-BG" dirty="0"/>
+              <a:t> на колоните и редовете и имената им (</a:t>
+            </a:r>
+            <a:r>
+              <a:rPr lang="en-US" b="1" dirty="0"/>
               <a:t>A1</a:t>
             </a:r>
             <a:r>
-              <a:rPr lang="en-US" dirty="0" smtClean="0"/>
+              <a:rPr lang="en-US" dirty="0"/>
               <a:t>, </a:t>
             </a:r>
             <a:r>
-              <a:rPr lang="en-US" b="1" dirty="0" smtClean="0"/>
+              <a:rPr lang="en-US" b="1" dirty="0"/>
               <a:t>AB42</a:t>
             </a:r>
             <a:r>
-              <a:rPr lang="en-US" dirty="0" smtClean="0"/>
+              <a:rPr lang="en-US" dirty="0"/>
               <a:t>…</a:t>
             </a:r>
             <a:r>
-              <a:rPr lang="bg-BG" dirty="0" smtClean="0"/>
+              <a:rPr lang="bg-BG" dirty="0"/>
               <a:t>)</a:t>
             </a:r>
-            <a:endParaRPr lang="en-US" dirty="0" smtClean="0"/>
+            <a:endParaRPr lang="en-US" dirty="0"/>
           </a:p>
         </p:txBody>
       </p:sp>
@@ -14442,7 +14697,7 @@
           <a:lstStyle/>
           <a:p>
             <a:r>
-              <a:rPr lang="bg-BG" dirty="0" smtClean="0"/>
+              <a:rPr lang="bg-BG" dirty="0"/>
               <a:t>Основни елементи на ел. таблица (1)</a:t>
             </a:r>
             <a:endParaRPr lang="en-US" dirty="0"/>
@@ -14767,19 +15022,7 @@
           <a:p>
             <a:r>
               <a:rPr lang="bg-BG" dirty="0"/>
-              <a:t>Основни елементи на </a:t>
-            </a:r>
-            <a:r>
-              <a:rPr lang="bg-BG" dirty="0" smtClean="0"/>
-              <a:t>ел. </a:t>
-            </a:r>
-            <a:r>
-              <a:rPr lang="bg-BG" dirty="0"/>
-              <a:t>т</a:t>
-            </a:r>
-            <a:r>
-              <a:rPr lang="bg-BG" dirty="0" smtClean="0"/>
-              <a:t>аблица (2)</a:t>
+              <a:t>Основни елементи на ел. таблица (2)</a:t>
             </a:r>
             <a:endParaRPr lang="en-US" dirty="0"/>
           </a:p>
@@ -14882,7 +15125,7 @@
           <a:p>
             <a:pPr algn="ctr"/>
             <a:r>
-              <a:rPr lang="bg-BG" sz="2800" b="1" dirty="0" smtClean="0">
+              <a:rPr lang="bg-BG" sz="2800" b="1" dirty="0">
                 <a:solidFill>
                   <a:srgbClr val="FFFFFF"/>
                 </a:solidFill>
@@ -15048,7 +15291,7 @@
           <a:p>
             <a:pPr algn="ctr"/>
             <a:r>
-              <a:rPr lang="bg-BG" sz="2800" b="1" dirty="0" smtClean="0">
+              <a:rPr lang="bg-BG" sz="2800" b="1" dirty="0">
                 <a:solidFill>
                   <a:srgbClr val="FFFFFF"/>
                 </a:solidFill>
@@ -15214,7 +15457,7 @@
           <a:p>
             <a:pPr algn="ctr"/>
             <a:r>
-              <a:rPr lang="bg-BG" sz="2800" b="1" dirty="0" smtClean="0">
+              <a:rPr lang="bg-BG" sz="2800" b="1" dirty="0">
                 <a:solidFill>
                   <a:srgbClr val="FFFFFF"/>
                 </a:solidFill>
@@ -15303,7 +15546,7 @@
           <a:p>
             <a:pPr algn="ctr"/>
             <a:r>
-              <a:rPr lang="bg-BG" sz="2800" b="1" dirty="0" smtClean="0">
+              <a:rPr lang="bg-BG" sz="2800" b="1" dirty="0">
                 <a:solidFill>
                   <a:srgbClr val="FFFFFF"/>
                 </a:solidFill>
@@ -15810,7 +16053,7 @@
           <a:lstStyle/>
           <a:p>
             <a:r>
-              <a:rPr lang="bg-BG" dirty="0" smtClean="0"/>
+              <a:rPr lang="bg-BG" dirty="0"/>
               <a:t>Програма за създаване на ел. таблици</a:t>
             </a:r>
             <a:endParaRPr lang="en-US" dirty="0"/>
@@ -15834,13 +16077,8 @@
           <a:p>
             <a:r>
               <a:rPr lang="en-US" dirty="0"/>
-              <a:t>Microsoft </a:t>
-            </a:r>
-            <a:r>
-              <a:rPr lang="en-US" dirty="0" smtClean="0"/>
-              <a:t>Excel</a:t>
-            </a:r>
-            <a:endParaRPr lang="en-US" dirty="0"/>
+              <a:t>Microsoft Excel</a:t>
+            </a:r>
           </a:p>
         </p:txBody>
       </p:sp>
@@ -15924,13 +16162,6 @@
       <p:transition spd="slow" advClick="0" advTm="5000"/>
     </mc:Fallback>
   </mc:AlternateContent>
-  <p:timing>
-    <p:tnLst>
-      <p:par>
-        <p:cTn id="1" dur="indefinite" restart="never" nodeType="tmRoot"/>
-      </p:par>
-    </p:tnLst>
-  </p:timing>
 </p:sld>
 </file>
 

</xml_diff>